<commit_message>
added a script to compute the phycobillisome/chlorophyll a ratios and plot them as barplots with error bars
</commit_message>
<xml_diff>
--- a/WRITING/Figures/Figure01_Absorption spectra workflow/Figure01_Absorption spectra workflow.pptx
+++ b/WRITING/Figures/Figure01_Absorption spectra workflow/Figure01_Absorption spectra workflow.pptx
@@ -197,7 +197,7 @@
           <a:p>
             <a:fld id="{01698B92-29B1-4381-BBF9-EC86AF86747A}" type="datetimeFigureOut">
               <a:rPr lang="en-DE" smtClean="0"/>
-              <a:t>02/05/2024</a:t>
+              <a:t>08/05/2024</a:t>
             </a:fld>
             <a:endParaRPr lang="en-DE"/>
           </a:p>
@@ -761,7 +761,7 @@
           <a:p>
             <a:fld id="{4CF8968A-CAEF-465A-BEEE-B0B6E30A31B2}" type="datetimeFigureOut">
               <a:rPr lang="en-DE" smtClean="0"/>
-              <a:t>02/05/2024</a:t>
+              <a:t>08/05/2024</a:t>
             </a:fld>
             <a:endParaRPr lang="en-DE"/>
           </a:p>
@@ -931,7 +931,7 @@
           <a:p>
             <a:fld id="{4CF8968A-CAEF-465A-BEEE-B0B6E30A31B2}" type="datetimeFigureOut">
               <a:rPr lang="en-DE" smtClean="0"/>
-              <a:t>02/05/2024</a:t>
+              <a:t>08/05/2024</a:t>
             </a:fld>
             <a:endParaRPr lang="en-DE"/>
           </a:p>
@@ -1111,7 +1111,7 @@
           <a:p>
             <a:fld id="{4CF8968A-CAEF-465A-BEEE-B0B6E30A31B2}" type="datetimeFigureOut">
               <a:rPr lang="en-DE" smtClean="0"/>
-              <a:t>02/05/2024</a:t>
+              <a:t>08/05/2024</a:t>
             </a:fld>
             <a:endParaRPr lang="en-DE"/>
           </a:p>
@@ -1281,7 +1281,7 @@
           <a:p>
             <a:fld id="{4CF8968A-CAEF-465A-BEEE-B0B6E30A31B2}" type="datetimeFigureOut">
               <a:rPr lang="en-DE" smtClean="0"/>
-              <a:t>02/05/2024</a:t>
+              <a:t>08/05/2024</a:t>
             </a:fld>
             <a:endParaRPr lang="en-DE"/>
           </a:p>
@@ -1525,7 +1525,7 @@
           <a:p>
             <a:fld id="{4CF8968A-CAEF-465A-BEEE-B0B6E30A31B2}" type="datetimeFigureOut">
               <a:rPr lang="en-DE" smtClean="0"/>
-              <a:t>02/05/2024</a:t>
+              <a:t>08/05/2024</a:t>
             </a:fld>
             <a:endParaRPr lang="en-DE"/>
           </a:p>
@@ -1757,7 +1757,7 @@
           <a:p>
             <a:fld id="{4CF8968A-CAEF-465A-BEEE-B0B6E30A31B2}" type="datetimeFigureOut">
               <a:rPr lang="en-DE" smtClean="0"/>
-              <a:t>02/05/2024</a:t>
+              <a:t>08/05/2024</a:t>
             </a:fld>
             <a:endParaRPr lang="en-DE"/>
           </a:p>
@@ -2124,7 +2124,7 @@
           <a:p>
             <a:fld id="{4CF8968A-CAEF-465A-BEEE-B0B6E30A31B2}" type="datetimeFigureOut">
               <a:rPr lang="en-DE" smtClean="0"/>
-              <a:t>02/05/2024</a:t>
+              <a:t>08/05/2024</a:t>
             </a:fld>
             <a:endParaRPr lang="en-DE"/>
           </a:p>
@@ -2242,7 +2242,7 @@
           <a:p>
             <a:fld id="{4CF8968A-CAEF-465A-BEEE-B0B6E30A31B2}" type="datetimeFigureOut">
               <a:rPr lang="en-DE" smtClean="0"/>
-              <a:t>02/05/2024</a:t>
+              <a:t>08/05/2024</a:t>
             </a:fld>
             <a:endParaRPr lang="en-DE"/>
           </a:p>
@@ -2337,7 +2337,7 @@
           <a:p>
             <a:fld id="{4CF8968A-CAEF-465A-BEEE-B0B6E30A31B2}" type="datetimeFigureOut">
               <a:rPr lang="en-DE" smtClean="0"/>
-              <a:t>02/05/2024</a:t>
+              <a:t>08/05/2024</a:t>
             </a:fld>
             <a:endParaRPr lang="en-DE"/>
           </a:p>
@@ -2614,7 +2614,7 @@
           <a:p>
             <a:fld id="{4CF8968A-CAEF-465A-BEEE-B0B6E30A31B2}" type="datetimeFigureOut">
               <a:rPr lang="en-DE" smtClean="0"/>
-              <a:t>02/05/2024</a:t>
+              <a:t>08/05/2024</a:t>
             </a:fld>
             <a:endParaRPr lang="en-DE"/>
           </a:p>
@@ -2871,7 +2871,7 @@
           <a:p>
             <a:fld id="{4CF8968A-CAEF-465A-BEEE-B0B6E30A31B2}" type="datetimeFigureOut">
               <a:rPr lang="en-DE" smtClean="0"/>
-              <a:t>02/05/2024</a:t>
+              <a:t>08/05/2024</a:t>
             </a:fld>
             <a:endParaRPr lang="en-DE"/>
           </a:p>
@@ -3084,7 +3084,7 @@
           <a:p>
             <a:fld id="{4CF8968A-CAEF-465A-BEEE-B0B6E30A31B2}" type="datetimeFigureOut">
               <a:rPr lang="en-DE" smtClean="0"/>
-              <a:t>02/05/2024</a:t>
+              <a:t>08/05/2024</a:t>
             </a:fld>
             <a:endParaRPr lang="en-DE"/>
           </a:p>
@@ -3628,8 +3628,8 @@
           </a:prstGeom>
         </p:spPr>
       </p:pic>
-      <mc:AlternateContent xmlns:mc="http://schemas.openxmlformats.org/markup-compatibility/2006">
-        <mc:Choice xmlns:a14="http://schemas.microsoft.com/office/drawing/2010/main" Requires="a14">
+      <mc:AlternateContent xmlns:mc="http://schemas.openxmlformats.org/markup-compatibility/2006" xmlns:a14="http://schemas.microsoft.com/office/drawing/2010/main">
+        <mc:Choice Requires="a14">
           <p:sp>
             <p:nvSpPr>
               <p:cNvPr id="4" name="TextBox 3">
@@ -3828,7 +3828,7 @@
             </p:txBody>
           </p:sp>
         </mc:Choice>
-        <mc:Fallback>
+        <mc:Fallback xmlns="">
           <p:sp>
             <p:nvSpPr>
               <p:cNvPr id="4" name="TextBox 3">
@@ -3873,8 +3873,8 @@
           </p:sp>
         </mc:Fallback>
       </mc:AlternateContent>
-      <mc:AlternateContent xmlns:mc="http://schemas.openxmlformats.org/markup-compatibility/2006">
-        <mc:Choice xmlns:a14="http://schemas.microsoft.com/office/drawing/2010/main" Requires="a14">
+      <mc:AlternateContent xmlns:mc="http://schemas.openxmlformats.org/markup-compatibility/2006" xmlns:a14="http://schemas.microsoft.com/office/drawing/2010/main">
+        <mc:Choice Requires="a14">
           <p:sp>
             <p:nvSpPr>
               <p:cNvPr id="5" name="TextBox 4">
@@ -4047,7 +4047,7 @@
             </p:txBody>
           </p:sp>
         </mc:Choice>
-        <mc:Fallback>
+        <mc:Fallback xmlns="">
           <p:sp>
             <p:nvSpPr>
               <p:cNvPr id="5" name="TextBox 4">
@@ -4092,8 +4092,8 @@
           </p:sp>
         </mc:Fallback>
       </mc:AlternateContent>
-      <mc:AlternateContent xmlns:mc="http://schemas.openxmlformats.org/markup-compatibility/2006">
-        <mc:Choice xmlns:a14="http://schemas.microsoft.com/office/drawing/2010/main" Requires="a14">
+      <mc:AlternateContent xmlns:mc="http://schemas.openxmlformats.org/markup-compatibility/2006" xmlns:a14="http://schemas.microsoft.com/office/drawing/2010/main">
+        <mc:Choice Requires="a14">
           <p:graphicFrame>
             <p:nvGraphicFramePr>
               <p:cNvPr id="8" name="Table 7">
@@ -4446,7 +4446,7 @@
             </a:graphic>
           </p:graphicFrame>
         </mc:Choice>
-        <mc:Fallback>
+        <mc:Fallback xmlns="">
           <p:graphicFrame>
             <p:nvGraphicFramePr>
               <p:cNvPr id="8" name="Table 7">
@@ -5220,8 +5220,8 @@
           </a:p>
         </p:txBody>
       </p:sp>
-      <mc:AlternateContent xmlns:mc="http://schemas.openxmlformats.org/markup-compatibility/2006">
-        <mc:Choice xmlns:a14="http://schemas.microsoft.com/office/drawing/2010/main" Requires="a14">
+      <mc:AlternateContent xmlns:mc="http://schemas.openxmlformats.org/markup-compatibility/2006" xmlns:a14="http://schemas.microsoft.com/office/drawing/2010/main">
+        <mc:Choice Requires="a14">
           <p:sp>
             <p:nvSpPr>
               <p:cNvPr id="19" name="TextBox 18">
@@ -5352,7 +5352,7 @@
             </p:txBody>
           </p:sp>
         </mc:Choice>
-        <mc:Fallback>
+        <mc:Fallback xmlns="">
           <p:sp>
             <p:nvSpPr>
               <p:cNvPr id="19" name="TextBox 18">
@@ -5526,6 +5526,47 @@
           </a:p>
         </p:txBody>
       </p:sp>
+      <p:cxnSp>
+        <p:nvCxnSpPr>
+          <p:cNvPr id="6" name="Straight Arrow Connector 5">
+            <a:extLst>
+              <a:ext uri="{FF2B5EF4-FFF2-40B4-BE49-F238E27FC236}">
+                <a16:creationId xmlns:a16="http://schemas.microsoft.com/office/drawing/2014/main" id="{5762ED17-463B-4A31-A5EF-3BE199575B95}"/>
+              </a:ext>
+            </a:extLst>
+          </p:cNvPr>
+          <p:cNvCxnSpPr>
+            <a:cxnSpLocks/>
+          </p:cNvCxnSpPr>
+          <p:nvPr/>
+        </p:nvCxnSpPr>
+        <p:spPr>
+          <a:xfrm>
+            <a:off x="476093" y="4289515"/>
+            <a:ext cx="0" cy="671129"/>
+          </a:xfrm>
+          <a:prstGeom prst="straightConnector1">
+            <a:avLst/>
+          </a:prstGeom>
+          <a:ln w="19050">
+            <a:tailEnd type="triangle"/>
+          </a:ln>
+        </p:spPr>
+        <p:style>
+          <a:lnRef idx="1">
+            <a:schemeClr val="dk1"/>
+          </a:lnRef>
+          <a:fillRef idx="0">
+            <a:schemeClr val="dk1"/>
+          </a:fillRef>
+          <a:effectRef idx="0">
+            <a:schemeClr val="dk1"/>
+          </a:effectRef>
+          <a:fontRef idx="minor">
+            <a:schemeClr val="tx1"/>
+          </a:fontRef>
+        </p:style>
+      </p:cxnSp>
     </p:spTree>
     <p:extLst>
       <p:ext uri="{BB962C8B-B14F-4D97-AF65-F5344CB8AC3E}">

</xml_diff>

<commit_message>
renamed figures with their new numbers after figure 03 was cancelled
</commit_message>
<xml_diff>
--- a/WRITING/Figures/Figure01_Absorption spectra workflow/Figure01_Absorption spectra workflow.pptx
+++ b/WRITING/Figures/Figure01_Absorption spectra workflow/Figure01_Absorption spectra workflow.pptx
@@ -197,7 +197,7 @@
           <a:p>
             <a:fld id="{01698B92-29B1-4381-BBF9-EC86AF86747A}" type="datetimeFigureOut">
               <a:rPr lang="en-DE" smtClean="0"/>
-              <a:t>08/05/2024</a:t>
+              <a:t>15/05/2024</a:t>
             </a:fld>
             <a:endParaRPr lang="en-DE"/>
           </a:p>
@@ -761,7 +761,7 @@
           <a:p>
             <a:fld id="{4CF8968A-CAEF-465A-BEEE-B0B6E30A31B2}" type="datetimeFigureOut">
               <a:rPr lang="en-DE" smtClean="0"/>
-              <a:t>08/05/2024</a:t>
+              <a:t>15/05/2024</a:t>
             </a:fld>
             <a:endParaRPr lang="en-DE"/>
           </a:p>
@@ -931,7 +931,7 @@
           <a:p>
             <a:fld id="{4CF8968A-CAEF-465A-BEEE-B0B6E30A31B2}" type="datetimeFigureOut">
               <a:rPr lang="en-DE" smtClean="0"/>
-              <a:t>08/05/2024</a:t>
+              <a:t>15/05/2024</a:t>
             </a:fld>
             <a:endParaRPr lang="en-DE"/>
           </a:p>
@@ -1111,7 +1111,7 @@
           <a:p>
             <a:fld id="{4CF8968A-CAEF-465A-BEEE-B0B6E30A31B2}" type="datetimeFigureOut">
               <a:rPr lang="en-DE" smtClean="0"/>
-              <a:t>08/05/2024</a:t>
+              <a:t>15/05/2024</a:t>
             </a:fld>
             <a:endParaRPr lang="en-DE"/>
           </a:p>
@@ -1281,7 +1281,7 @@
           <a:p>
             <a:fld id="{4CF8968A-CAEF-465A-BEEE-B0B6E30A31B2}" type="datetimeFigureOut">
               <a:rPr lang="en-DE" smtClean="0"/>
-              <a:t>08/05/2024</a:t>
+              <a:t>15/05/2024</a:t>
             </a:fld>
             <a:endParaRPr lang="en-DE"/>
           </a:p>
@@ -1525,7 +1525,7 @@
           <a:p>
             <a:fld id="{4CF8968A-CAEF-465A-BEEE-B0B6E30A31B2}" type="datetimeFigureOut">
               <a:rPr lang="en-DE" smtClean="0"/>
-              <a:t>08/05/2024</a:t>
+              <a:t>15/05/2024</a:t>
             </a:fld>
             <a:endParaRPr lang="en-DE"/>
           </a:p>
@@ -1757,7 +1757,7 @@
           <a:p>
             <a:fld id="{4CF8968A-CAEF-465A-BEEE-B0B6E30A31B2}" type="datetimeFigureOut">
               <a:rPr lang="en-DE" smtClean="0"/>
-              <a:t>08/05/2024</a:t>
+              <a:t>15/05/2024</a:t>
             </a:fld>
             <a:endParaRPr lang="en-DE"/>
           </a:p>
@@ -2124,7 +2124,7 @@
           <a:p>
             <a:fld id="{4CF8968A-CAEF-465A-BEEE-B0B6E30A31B2}" type="datetimeFigureOut">
               <a:rPr lang="en-DE" smtClean="0"/>
-              <a:t>08/05/2024</a:t>
+              <a:t>15/05/2024</a:t>
             </a:fld>
             <a:endParaRPr lang="en-DE"/>
           </a:p>
@@ -2242,7 +2242,7 @@
           <a:p>
             <a:fld id="{4CF8968A-CAEF-465A-BEEE-B0B6E30A31B2}" type="datetimeFigureOut">
               <a:rPr lang="en-DE" smtClean="0"/>
-              <a:t>08/05/2024</a:t>
+              <a:t>15/05/2024</a:t>
             </a:fld>
             <a:endParaRPr lang="en-DE"/>
           </a:p>
@@ -2337,7 +2337,7 @@
           <a:p>
             <a:fld id="{4CF8968A-CAEF-465A-BEEE-B0B6E30A31B2}" type="datetimeFigureOut">
               <a:rPr lang="en-DE" smtClean="0"/>
-              <a:t>08/05/2024</a:t>
+              <a:t>15/05/2024</a:t>
             </a:fld>
             <a:endParaRPr lang="en-DE"/>
           </a:p>
@@ -2614,7 +2614,7 @@
           <a:p>
             <a:fld id="{4CF8968A-CAEF-465A-BEEE-B0B6E30A31B2}" type="datetimeFigureOut">
               <a:rPr lang="en-DE" smtClean="0"/>
-              <a:t>08/05/2024</a:t>
+              <a:t>15/05/2024</a:t>
             </a:fld>
             <a:endParaRPr lang="en-DE"/>
           </a:p>
@@ -2871,7 +2871,7 @@
           <a:p>
             <a:fld id="{4CF8968A-CAEF-465A-BEEE-B0B6E30A31B2}" type="datetimeFigureOut">
               <a:rPr lang="en-DE" smtClean="0"/>
-              <a:t>08/05/2024</a:t>
+              <a:t>15/05/2024</a:t>
             </a:fld>
             <a:endParaRPr lang="en-DE"/>
           </a:p>
@@ -3084,7 +3084,7 @@
           <a:p>
             <a:fld id="{4CF8968A-CAEF-465A-BEEE-B0B6E30A31B2}" type="datetimeFigureOut">
               <a:rPr lang="en-DE" smtClean="0"/>
-              <a:t>08/05/2024</a:t>
+              <a:t>15/05/2024</a:t>
             </a:fld>
             <a:endParaRPr lang="en-DE"/>
           </a:p>
@@ -4092,8 +4092,8 @@
           </p:sp>
         </mc:Fallback>
       </mc:AlternateContent>
-      <mc:AlternateContent xmlns:mc="http://schemas.openxmlformats.org/markup-compatibility/2006" xmlns:a14="http://schemas.microsoft.com/office/drawing/2010/main">
-        <mc:Choice Requires="a14">
+      <mc:AlternateContent xmlns:mc="http://schemas.openxmlformats.org/markup-compatibility/2006">
+        <mc:Choice xmlns:a14="http://schemas.microsoft.com/office/drawing/2010/main" Requires="a14">
           <p:graphicFrame>
             <p:nvGraphicFramePr>
               <p:cNvPr id="8" name="Table 7">
@@ -4109,14 +4109,14 @@
               <p:nvPr>
                 <p:extLst>
                   <p:ext uri="{D42A27DB-BD31-4B8C-83A1-F6EECF244321}">
-                    <p14:modId xmlns:p14="http://schemas.microsoft.com/office/powerpoint/2010/main" val="806563329"/>
+                    <p14:modId xmlns:p14="http://schemas.microsoft.com/office/powerpoint/2010/main" val="417085041"/>
                   </p:ext>
                 </p:extLst>
               </p:nvPr>
             </p:nvGraphicFramePr>
             <p:xfrm>
               <a:off x="3500113" y="4378860"/>
-              <a:ext cx="1785263" cy="1465942"/>
+              <a:ext cx="1785263" cy="1451211"/>
             </p:xfrm>
             <a:graphic>
               <a:graphicData uri="http://schemas.openxmlformats.org/drawingml/2006/table">
@@ -4425,7 +4425,7 @@
                               <a:ea typeface="Cambria Math" panose="02040503050406030204" pitchFamily="18" charset="0"/>
                               <a:cs typeface="Arial" panose="020B0604020202020204" pitchFamily="34" charset="0"/>
                             </a:rPr>
-                            <a:t>number of replicates (n=3)</a:t>
+                            <a:t>number of replicates</a:t>
                           </a:r>
                           <a:endParaRPr lang="en-DE" sz="1000" dirty="0">
                             <a:latin typeface="Arial" panose="020B0604020202020204" pitchFamily="34" charset="0"/>
@@ -4446,7 +4446,7 @@
             </a:graphic>
           </p:graphicFrame>
         </mc:Choice>
-        <mc:Fallback xmlns="">
+        <mc:Fallback>
           <p:graphicFrame>
             <p:nvGraphicFramePr>
               <p:cNvPr id="8" name="Table 7">
@@ -4462,14 +4462,14 @@
               <p:nvPr>
                 <p:extLst>
                   <p:ext uri="{D42A27DB-BD31-4B8C-83A1-F6EECF244321}">
-                    <p14:modId xmlns:p14="http://schemas.microsoft.com/office/powerpoint/2010/main" val="806563329"/>
+                    <p14:modId xmlns:p14="http://schemas.microsoft.com/office/powerpoint/2010/main" val="417085041"/>
                   </p:ext>
                 </p:extLst>
               </p:nvPr>
             </p:nvGraphicFramePr>
             <p:xfrm>
               <a:off x="3500113" y="4378860"/>
-              <a:ext cx="1785263" cy="1465942"/>
+              <a:ext cx="1785263" cy="1451211"/>
             </p:xfrm>
             <a:graphic>
               <a:graphicData uri="http://schemas.openxmlformats.org/drawingml/2006/table">
@@ -4506,7 +4506,7 @@
                         <a:blipFill>
                           <a:blip r:embed="rId6"/>
                           <a:stretch>
-                            <a:fillRect r="-415789" b="-512500"/>
+                            <a:fillRect r="-415789" b="-497500"/>
                           </a:stretch>
                         </a:blipFill>
                       </a:tcPr>
@@ -4701,7 +4701,7 @@
                       </a:ext>
                     </a:extLst>
                   </a:tr>
-                  <a:tr h="396240">
+                  <a:tr h="381509">
                     <a:tc>
                       <a:txBody>
                         <a:bodyPr/>
@@ -4751,7 +4751,7 @@
                               <a:ea typeface="Cambria Math" panose="02040503050406030204" pitchFamily="18" charset="0"/>
                               <a:cs typeface="Arial" panose="020B0604020202020204" pitchFamily="34" charset="0"/>
                             </a:rPr>
-                            <a:t>number of replicates (n=3)</a:t>
+                            <a:t>number of replicates</a:t>
                           </a:r>
                           <a:endParaRPr lang="en-DE" sz="1000" dirty="0">
                             <a:latin typeface="Arial" panose="020B0604020202020204" pitchFamily="34" charset="0"/>

</xml_diff>